<commit_message>
Journal ideas for publication
</commit_message>
<xml_diff>
--- a/Documents/Journaux_indications.pptx
+++ b/Documents/Journaux_indications.pptx
@@ -8,9 +8,9 @@
     <p:notesMasterId r:id="rId5"/>
   </p:notesMasterIdLst>
   <p:sldIdLst>
-    <p:sldId id="262" r:id="rId2"/>
-    <p:sldId id="263" r:id="rId3"/>
-    <p:sldId id="264" r:id="rId4"/>
+    <p:sldId id="265" r:id="rId2"/>
+    <p:sldId id="264" r:id="rId3"/>
+    <p:sldId id="262" r:id="rId4"/>
   </p:sldIdLst>
   <p:sldSz cx="12192000" cy="6858000"/>
   <p:notesSz cx="6858000" cy="9144000"/>
@@ -211,7 +211,7 @@
           <a:p>
             <a:fld id="{CA0487E4-8977-4435-9767-431453041D86}" type="datetimeFigureOut">
               <a:rPr lang="en-US" smtClean="0"/>
-              <a:t>1/21/2025</a:t>
+              <a:t>2/5/2025</a:t>
             </a:fld>
             <a:endParaRPr lang="en-US"/>
           </a:p>
@@ -628,7 +628,7 @@
           <a:p>
             <a:fld id="{E4C0FCB3-52D6-429D-8EEB-ECC2DDBFE593}" type="datetime1">
               <a:rPr lang="en-US" smtClean="0"/>
-              <a:t>1/21/2025</a:t>
+              <a:t>2/5/2025</a:t>
             </a:fld>
             <a:endParaRPr lang="en-US"/>
           </a:p>
@@ -828,7 +828,7 @@
           <a:p>
             <a:fld id="{C14FDDEC-43EB-4402-A894-49EBA5F669BC}" type="datetime1">
               <a:rPr lang="en-US" smtClean="0"/>
-              <a:t>1/21/2025</a:t>
+              <a:t>2/5/2025</a:t>
             </a:fld>
             <a:endParaRPr lang="en-US"/>
           </a:p>
@@ -1038,7 +1038,7 @@
           <a:p>
             <a:fld id="{0F9FFFF5-9BA5-4362-8C99-BDD0BD63D6BF}" type="datetime1">
               <a:rPr lang="en-US" smtClean="0"/>
-              <a:t>1/21/2025</a:t>
+              <a:t>2/5/2025</a:t>
             </a:fld>
             <a:endParaRPr lang="en-US"/>
           </a:p>
@@ -1238,7 +1238,7 @@
           <a:p>
             <a:fld id="{D0FCB337-F03C-419A-B728-77697081B5CB}" type="datetime1">
               <a:rPr lang="en-US" smtClean="0"/>
-              <a:t>1/21/2025</a:t>
+              <a:t>2/5/2025</a:t>
             </a:fld>
             <a:endParaRPr lang="en-US"/>
           </a:p>
@@ -1514,7 +1514,7 @@
           <a:p>
             <a:fld id="{658ABB29-787F-4BC9-9838-FA048E57D2E1}" type="datetime1">
               <a:rPr lang="en-US" smtClean="0"/>
-              <a:t>1/21/2025</a:t>
+              <a:t>2/5/2025</a:t>
             </a:fld>
             <a:endParaRPr lang="en-US"/>
           </a:p>
@@ -1782,7 +1782,7 @@
           <a:p>
             <a:fld id="{0CD9637E-68CD-4908-A844-A3068EF4DDD4}" type="datetime1">
               <a:rPr lang="en-US" smtClean="0"/>
-              <a:t>1/21/2025</a:t>
+              <a:t>2/5/2025</a:t>
             </a:fld>
             <a:endParaRPr lang="en-US"/>
           </a:p>
@@ -2197,7 +2197,7 @@
           <a:p>
             <a:fld id="{5B5D8E17-E1EB-4873-998B-3F7EE6B1DCCD}" type="datetime1">
               <a:rPr lang="en-US" smtClean="0"/>
-              <a:t>1/21/2025</a:t>
+              <a:t>2/5/2025</a:t>
             </a:fld>
             <a:endParaRPr lang="en-US"/>
           </a:p>
@@ -2339,7 +2339,7 @@
           <a:p>
             <a:fld id="{377C253B-871C-4D4E-805B-60D4D3F33600}" type="datetime1">
               <a:rPr lang="en-US" smtClean="0"/>
-              <a:t>1/21/2025</a:t>
+              <a:t>2/5/2025</a:t>
             </a:fld>
             <a:endParaRPr lang="en-US"/>
           </a:p>
@@ -2452,7 +2452,7 @@
           <a:p>
             <a:fld id="{9CC6FFEB-1F2C-4CEC-BEC0-C37CAA061E22}" type="datetime1">
               <a:rPr lang="en-US" smtClean="0"/>
-              <a:t>1/21/2025</a:t>
+              <a:t>2/5/2025</a:t>
             </a:fld>
             <a:endParaRPr lang="en-US"/>
           </a:p>
@@ -2765,7 +2765,7 @@
           <a:p>
             <a:fld id="{B553111D-1985-405C-B327-608F43691A18}" type="datetime1">
               <a:rPr lang="en-US" smtClean="0"/>
-              <a:t>1/21/2025</a:t>
+              <a:t>2/5/2025</a:t>
             </a:fld>
             <a:endParaRPr lang="en-US"/>
           </a:p>
@@ -3054,7 +3054,7 @@
           <a:p>
             <a:fld id="{2A3DC28B-AE7D-402A-809A-035203BBCA02}" type="datetime1">
               <a:rPr lang="en-US" smtClean="0"/>
-              <a:t>1/21/2025</a:t>
+              <a:t>2/5/2025</a:t>
             </a:fld>
             <a:endParaRPr lang="en-US"/>
           </a:p>
@@ -3297,7 +3297,7 @@
           <a:p>
             <a:fld id="{2203A9BC-E20C-45DF-A577-89EA961A7E97}" type="datetime1">
               <a:rPr lang="en-US" smtClean="0"/>
-              <a:t>1/21/2025</a:t>
+              <a:t>2/5/2025</a:t>
             </a:fld>
             <a:endParaRPr lang="en-US"/>
           </a:p>
@@ -3720,7 +3720,7 @@
           <p:cNvPr id="2" name="Titre 1">
             <a:extLst>
               <a:ext uri="{FF2B5EF4-FFF2-40B4-BE49-F238E27FC236}">
-                <a16:creationId xmlns:a16="http://schemas.microsoft.com/office/drawing/2014/main" id="{25C64DB7-F060-4A44-BEFA-880352A3BBA3}"/>
+                <a16:creationId xmlns:a16="http://schemas.microsoft.com/office/drawing/2014/main" id="{89B30A99-C43B-4C3B-BA7F-1B048717EA92}"/>
               </a:ext>
             </a:extLst>
           </p:cNvPr>
@@ -3738,9 +3738,8 @@
           <a:p>
             <a:r>
               <a:rPr lang="fr-FR" dirty="0"/>
-              <a:t>JMIR</a:t>
-            </a:r>
-            <a:endParaRPr lang="en-US" dirty="0"/>
+              <a:t>Journal for publication / Impact Factor</a:t>
+            </a:r>
           </a:p>
         </p:txBody>
       </p:sp>
@@ -3749,7 +3748,7 @@
           <p:cNvPr id="3" name="Espace réservé du contenu 2">
             <a:extLst>
               <a:ext uri="{FF2B5EF4-FFF2-40B4-BE49-F238E27FC236}">
-                <a16:creationId xmlns:a16="http://schemas.microsoft.com/office/drawing/2014/main" id="{3F83C914-0343-44CC-9A83-36358D43C53D}"/>
+                <a16:creationId xmlns:a16="http://schemas.microsoft.com/office/drawing/2014/main" id="{2E0EEF64-AE23-4EF1-BB23-045B76E64E26}"/>
               </a:ext>
             </a:extLst>
           </p:cNvPr>
@@ -3762,249 +3761,413 @@
         </p:nvSpPr>
         <p:spPr>
           <a:xfrm>
-            <a:off x="838200" y="1825625"/>
-            <a:ext cx="5445154" cy="4351338"/>
+            <a:off x="838200" y="1480008"/>
+            <a:ext cx="10515600" cy="5241467"/>
           </a:xfrm>
         </p:spPr>
         <p:txBody>
           <a:bodyPr>
-            <a:normAutofit fontScale="85000" lnSpcReduction="20000"/>
+            <a:normAutofit fontScale="55000" lnSpcReduction="20000"/>
           </a:bodyPr>
           <a:lstStyle/>
           <a:p>
             <a:r>
-              <a:rPr lang="fr-FR" dirty="0" err="1"/>
-              <a:t>Title</a:t>
-            </a:r>
+              <a:rPr lang="fr-FR" dirty="0"/>
+              <a:t>CHEST / 9.5</a:t>
+            </a:r>
+          </a:p>
+          <a:p>
+            <a:r>
+              <a:rPr lang="fr-FR" dirty="0" err="1"/>
+              <a:t>Annual</a:t>
+            </a:r>
+            <a:r>
+              <a:rPr lang="fr-FR" dirty="0"/>
+              <a:t> </a:t>
+            </a:r>
+            <a:r>
+              <a:rPr lang="fr-FR" dirty="0" err="1"/>
+              <a:t>review</a:t>
+            </a:r>
+            <a:r>
+              <a:rPr lang="fr-FR" dirty="0"/>
+              <a:t> of </a:t>
+            </a:r>
+            <a:r>
+              <a:rPr lang="fr-FR" dirty="0" err="1"/>
+              <a:t>statistics</a:t>
+            </a:r>
+            <a:r>
+              <a:rPr lang="fr-FR" dirty="0"/>
+              <a:t> and </a:t>
+            </a:r>
+            <a:r>
+              <a:rPr lang="fr-FR" dirty="0" err="1"/>
+              <a:t>its</a:t>
+            </a:r>
+            <a:r>
+              <a:rPr lang="fr-FR" dirty="0"/>
+              <a:t> application / 7.4</a:t>
+            </a:r>
+          </a:p>
+          <a:p>
+            <a:r>
+              <a:rPr lang="fr-FR" dirty="0"/>
+              <a:t>Journal of </a:t>
+            </a:r>
+            <a:r>
+              <a:rPr lang="fr-FR" dirty="0" err="1"/>
+              <a:t>clinical</a:t>
+            </a:r>
+            <a:r>
+              <a:rPr lang="fr-FR" dirty="0"/>
+              <a:t> </a:t>
+            </a:r>
+            <a:r>
+              <a:rPr lang="fr-FR" dirty="0" err="1"/>
+              <a:t>epidemiology</a:t>
+            </a:r>
+            <a:r>
+              <a:rPr lang="fr-FR" dirty="0"/>
+              <a:t> / 7.3</a:t>
+            </a:r>
+          </a:p>
+          <a:p>
+            <a:r>
+              <a:rPr lang="fr-FR" dirty="0"/>
+              <a:t>J Med Internet </a:t>
+            </a:r>
+            <a:r>
+              <a:rPr lang="fr-FR" dirty="0" err="1"/>
+              <a:t>Res</a:t>
+            </a:r>
+            <a:r>
+              <a:rPr lang="fr-FR" dirty="0"/>
+              <a:t> / 5.8</a:t>
+            </a:r>
+          </a:p>
+          <a:p>
+            <a:r>
+              <a:rPr lang="fr-FR" dirty="0"/>
+              <a:t>Journal of </a:t>
+            </a:r>
+            <a:r>
+              <a:rPr lang="fr-FR" dirty="0" err="1"/>
+              <a:t>statistical</a:t>
+            </a:r>
+            <a:r>
+              <a:rPr lang="fr-FR" dirty="0"/>
+              <a:t> software / 5.4 </a:t>
+            </a:r>
+          </a:p>
+          <a:p>
+            <a:r>
+              <a:rPr lang="fr-FR" dirty="0"/>
+              <a:t>Journal of the American </a:t>
+            </a:r>
+            <a:r>
+              <a:rPr lang="fr-FR" dirty="0" err="1"/>
+              <a:t>Medical</a:t>
+            </a:r>
+            <a:r>
+              <a:rPr lang="fr-FR" dirty="0"/>
+              <a:t> </a:t>
+            </a:r>
+            <a:r>
+              <a:rPr lang="fr-FR" dirty="0" err="1"/>
+              <a:t>Informatics</a:t>
+            </a:r>
+            <a:r>
+              <a:rPr lang="fr-FR" dirty="0"/>
+              <a:t> Association / 4.7</a:t>
+            </a:r>
+          </a:p>
+          <a:p>
+            <a:r>
+              <a:rPr lang="fr-FR" dirty="0"/>
+              <a:t>Digital </a:t>
+            </a:r>
+            <a:r>
+              <a:rPr lang="fr-FR" dirty="0" err="1"/>
+              <a:t>Medicine</a:t>
+            </a:r>
+            <a:r>
+              <a:rPr lang="fr-FR" dirty="0"/>
+              <a:t> / 4.2</a:t>
+            </a:r>
+          </a:p>
+          <a:p>
+            <a:r>
+              <a:rPr lang="fr-FR" dirty="0"/>
+              <a:t>Vital &amp; </a:t>
+            </a:r>
+            <a:r>
+              <a:rPr lang="fr-FR" dirty="0" err="1"/>
+              <a:t>health</a:t>
+            </a:r>
+            <a:r>
+              <a:rPr lang="fr-FR" dirty="0"/>
+              <a:t> </a:t>
+            </a:r>
+            <a:r>
+              <a:rPr lang="fr-FR" dirty="0" err="1"/>
+              <a:t>statistics</a:t>
+            </a:r>
+            <a:r>
+              <a:rPr lang="fr-FR" dirty="0"/>
+              <a:t>. </a:t>
+            </a:r>
+            <a:r>
+              <a:rPr lang="fr-FR" dirty="0" err="1"/>
+              <a:t>Series</a:t>
+            </a:r>
+            <a:r>
+              <a:rPr lang="fr-FR" dirty="0"/>
+              <a:t> 2, data </a:t>
+            </a:r>
+            <a:r>
+              <a:rPr lang="fr-FR" dirty="0" err="1"/>
+              <a:t>evaluation</a:t>
+            </a:r>
+            <a:r>
+              <a:rPr lang="fr-FR" dirty="0"/>
+              <a:t> and </a:t>
+            </a:r>
+            <a:r>
+              <a:rPr lang="fr-FR" dirty="0" err="1"/>
+              <a:t>methods</a:t>
+            </a:r>
+            <a:r>
+              <a:rPr lang="fr-FR" dirty="0"/>
+              <a:t> </a:t>
+            </a:r>
+            <a:r>
+              <a:rPr lang="fr-FR" dirty="0" err="1"/>
+              <a:t>research</a:t>
+            </a:r>
+            <a:r>
+              <a:rPr lang="fr-FR" dirty="0"/>
+              <a:t> / 4.2</a:t>
+            </a:r>
+          </a:p>
+          <a:p>
+            <a:r>
+              <a:rPr lang="fr-FR" dirty="0" err="1"/>
+              <a:t>Statistical</a:t>
+            </a:r>
+            <a:r>
+              <a:rPr lang="fr-FR" dirty="0"/>
+              <a:t> science / 3.9</a:t>
+            </a:r>
+          </a:p>
+          <a:p>
+            <a:r>
+              <a:rPr lang="fr-FR" dirty="0"/>
+              <a:t>The </a:t>
+            </a:r>
+            <a:r>
+              <a:rPr lang="fr-FR" dirty="0" err="1"/>
+              <a:t>annals</a:t>
+            </a:r>
+            <a:r>
+              <a:rPr lang="fr-FR" dirty="0"/>
+              <a:t> of </a:t>
+            </a:r>
+            <a:r>
+              <a:rPr lang="fr-FR" dirty="0" err="1"/>
+              <a:t>statistics</a:t>
+            </a:r>
+            <a:r>
+              <a:rPr lang="fr-FR" dirty="0"/>
+              <a:t> / 3.2</a:t>
+            </a:r>
+          </a:p>
+          <a:p>
+            <a:r>
+              <a:rPr lang="fr-FR" dirty="0" err="1"/>
+              <a:t>Curr</a:t>
+            </a:r>
+            <a:r>
+              <a:rPr lang="fr-FR" dirty="0"/>
+              <a:t> </a:t>
+            </a:r>
+            <a:r>
+              <a:rPr lang="fr-FR" dirty="0" err="1"/>
+              <a:t>Epidemiol</a:t>
+            </a:r>
+            <a:r>
+              <a:rPr lang="fr-FR" dirty="0"/>
+              <a:t> Rep / 3.0</a:t>
+            </a:r>
+          </a:p>
+          <a:p>
+            <a:r>
+              <a:rPr lang="fr-FR" dirty="0"/>
+              <a:t>Journal of the </a:t>
+            </a:r>
+            <a:r>
+              <a:rPr lang="fr-FR" dirty="0" err="1"/>
+              <a:t>american</a:t>
+            </a:r>
+            <a:r>
+              <a:rPr lang="fr-FR" dirty="0"/>
+              <a:t> </a:t>
+            </a:r>
+            <a:r>
+              <a:rPr lang="fr-FR" dirty="0" err="1"/>
+              <a:t>statistical</a:t>
+            </a:r>
+            <a:r>
+              <a:rPr lang="fr-FR" dirty="0"/>
+              <a:t> association / 3.0</a:t>
+            </a:r>
+          </a:p>
+          <a:p>
+            <a:r>
+              <a:rPr lang="fr-FR" dirty="0" err="1"/>
+              <a:t>Statistics</a:t>
+            </a:r>
+            <a:r>
+              <a:rPr lang="fr-FR" dirty="0"/>
+              <a:t> in </a:t>
+            </a:r>
+            <a:r>
+              <a:rPr lang="fr-FR" dirty="0" err="1"/>
+              <a:t>medicine</a:t>
+            </a:r>
+            <a:r>
+              <a:rPr lang="fr-FR" dirty="0"/>
+              <a:t> / 1.8</a:t>
+            </a:r>
+          </a:p>
+          <a:p>
+            <a:r>
+              <a:rPr lang="fr-FR" dirty="0" err="1"/>
+              <a:t>Biostatistics</a:t>
+            </a:r>
+            <a:r>
+              <a:rPr lang="fr-FR" dirty="0"/>
+              <a:t> / 1.8</a:t>
+            </a:r>
+          </a:p>
+          <a:p>
+            <a:r>
+              <a:rPr lang="fr-FR" dirty="0"/>
+              <a:t>International </a:t>
+            </a:r>
+            <a:r>
+              <a:rPr lang="fr-FR" dirty="0" err="1"/>
+              <a:t>statistical</a:t>
+            </a:r>
+            <a:r>
+              <a:rPr lang="fr-FR" dirty="0"/>
+              <a:t> </a:t>
+            </a:r>
+            <a:r>
+              <a:rPr lang="fr-FR" dirty="0" err="1"/>
+              <a:t>review</a:t>
+            </a:r>
+            <a:r>
+              <a:rPr lang="fr-FR" dirty="0"/>
+              <a:t> / 1.7</a:t>
+            </a:r>
+          </a:p>
+          <a:p>
+            <a:r>
+              <a:rPr lang="fr-FR" dirty="0" err="1"/>
+              <a:t>Statistical</a:t>
+            </a:r>
+            <a:r>
+              <a:rPr lang="fr-FR" dirty="0"/>
+              <a:t> </a:t>
+            </a:r>
+            <a:r>
+              <a:rPr lang="fr-FR" dirty="0" err="1"/>
+              <a:t>methods</a:t>
+            </a:r>
+            <a:r>
+              <a:rPr lang="fr-FR" dirty="0"/>
+              <a:t> in </a:t>
+            </a:r>
+            <a:r>
+              <a:rPr lang="fr-FR" dirty="0" err="1"/>
+              <a:t>medical</a:t>
+            </a:r>
+            <a:r>
+              <a:rPr lang="fr-FR" dirty="0"/>
+              <a:t> </a:t>
+            </a:r>
+            <a:r>
+              <a:rPr lang="fr-FR" dirty="0" err="1"/>
+              <a:t>research</a:t>
+            </a:r>
+            <a:r>
+              <a:rPr lang="fr-FR" dirty="0"/>
+              <a:t> / 1.6</a:t>
+            </a:r>
+          </a:p>
+          <a:p>
+            <a:r>
+              <a:rPr lang="fr-FR" dirty="0" err="1"/>
+              <a:t>Statistics</a:t>
+            </a:r>
+            <a:r>
+              <a:rPr lang="fr-FR" dirty="0"/>
+              <a:t> and </a:t>
+            </a:r>
+            <a:r>
+              <a:rPr lang="fr-FR" dirty="0" err="1"/>
+              <a:t>computing</a:t>
+            </a:r>
+            <a:r>
+              <a:rPr lang="fr-FR" dirty="0"/>
+              <a:t> / 1.6</a:t>
+            </a:r>
+          </a:p>
+          <a:p>
+            <a:r>
+              <a:rPr lang="fr-FR" dirty="0"/>
+              <a:t>The </a:t>
+            </a:r>
+            <a:r>
+              <a:rPr lang="fr-FR" dirty="0" err="1"/>
+              <a:t>annals</a:t>
+            </a:r>
+            <a:r>
+              <a:rPr lang="fr-FR" dirty="0"/>
+              <a:t> of </a:t>
+            </a:r>
+            <a:r>
+              <a:rPr lang="fr-FR" dirty="0" err="1"/>
+              <a:t>applied</a:t>
+            </a:r>
+            <a:r>
+              <a:rPr lang="fr-FR" dirty="0"/>
+              <a:t> </a:t>
+            </a:r>
+            <a:r>
+              <a:rPr lang="fr-FR" dirty="0" err="1"/>
+              <a:t>statistics</a:t>
+            </a:r>
+            <a:r>
+              <a:rPr lang="fr-FR" dirty="0"/>
+              <a:t> / 1.3</a:t>
+            </a:r>
+          </a:p>
+          <a:p>
+            <a:pPr marL="0" indent="0">
+              <a:buNone/>
+            </a:pPr>
             <a:endParaRPr lang="fr-FR" dirty="0"/>
           </a:p>
-          <a:p>
-            <a:r>
-              <a:rPr lang="fr-FR" dirty="0"/>
-              <a:t>Abstract (450 </a:t>
-            </a:r>
-            <a:r>
-              <a:rPr lang="fr-FR" dirty="0" err="1"/>
-              <a:t>words</a:t>
-            </a:r>
-            <a:r>
-              <a:rPr lang="fr-FR" dirty="0"/>
-              <a:t>)</a:t>
-            </a:r>
-          </a:p>
-          <a:p>
-            <a:r>
-              <a:rPr lang="fr-FR" dirty="0"/>
-              <a:t>Keywords</a:t>
-            </a:r>
-          </a:p>
-          <a:p>
-            <a:r>
-              <a:rPr lang="fr-FR" dirty="0"/>
-              <a:t>Introduction</a:t>
-            </a:r>
-          </a:p>
-          <a:p>
-            <a:r>
-              <a:rPr lang="fr-FR" dirty="0"/>
-              <a:t>Methods</a:t>
-            </a:r>
-          </a:p>
-          <a:p>
-            <a:r>
-              <a:rPr lang="fr-FR" dirty="0" err="1"/>
-              <a:t>Results</a:t>
-            </a:r>
-            <a:endParaRPr lang="fr-FR" dirty="0"/>
-          </a:p>
-          <a:p>
-            <a:r>
-              <a:rPr lang="fr-FR" dirty="0"/>
-              <a:t>Discussion (conclusion dans cette partie)</a:t>
-            </a:r>
-          </a:p>
-          <a:p>
-            <a:r>
-              <a:rPr lang="fr-FR" dirty="0" err="1"/>
-              <a:t>Acknowledgments</a:t>
-            </a:r>
-            <a:endParaRPr lang="fr-FR" dirty="0"/>
-          </a:p>
-          <a:p>
-            <a:r>
-              <a:rPr lang="fr-FR" dirty="0" err="1"/>
-              <a:t>Conflicts</a:t>
-            </a:r>
-            <a:r>
-              <a:rPr lang="fr-FR" dirty="0"/>
-              <a:t> of </a:t>
-            </a:r>
-            <a:r>
-              <a:rPr lang="fr-FR" dirty="0" err="1"/>
-              <a:t>interest</a:t>
-            </a:r>
-            <a:endParaRPr lang="fr-FR" dirty="0"/>
-          </a:p>
-          <a:p>
-            <a:r>
-              <a:rPr lang="fr-FR" dirty="0" err="1"/>
-              <a:t>Ref</a:t>
-            </a:r>
-            <a:endParaRPr lang="fr-FR" dirty="0"/>
-          </a:p>
-          <a:p>
-            <a:r>
-              <a:rPr lang="fr-FR" dirty="0" err="1"/>
-              <a:t>Abbreviations</a:t>
-            </a:r>
-            <a:endParaRPr lang="en-US" dirty="0"/>
-          </a:p>
-        </p:txBody>
-      </p:sp>
-      <p:sp>
-        <p:nvSpPr>
-          <p:cNvPr id="4" name="ZoneTexte 3">
-            <a:extLst>
-              <a:ext uri="{FF2B5EF4-FFF2-40B4-BE49-F238E27FC236}">
-                <a16:creationId xmlns:a16="http://schemas.microsoft.com/office/drawing/2014/main" id="{41FCB5BA-958F-492A-A649-E5DFC6B954E2}"/>
-              </a:ext>
-            </a:extLst>
-          </p:cNvPr>
-          <p:cNvSpPr txBox="1"/>
-          <p:nvPr/>
-        </p:nvSpPr>
-        <p:spPr>
-          <a:xfrm>
-            <a:off x="8019875" y="1568741"/>
-            <a:ext cx="3187817" cy="3323987"/>
-          </a:xfrm>
-          <a:prstGeom prst="rect">
-            <a:avLst/>
-          </a:prstGeom>
-          <a:noFill/>
-        </p:spPr>
-        <p:txBody>
-          <a:bodyPr wrap="square" rtlCol="0">
-            <a:spAutoFit/>
-          </a:bodyPr>
-          <a:lstStyle/>
-          <a:p>
-            <a:pPr marL="285750" indent="-285750">
-              <a:buFont typeface="Arial" panose="020B0604020202020204" pitchFamily="34" charset="0"/>
-              <a:buChar char="•"/>
-            </a:pPr>
-            <a:r>
-              <a:rPr lang="fr-FR" dirty="0"/>
-              <a:t>Tables and figures </a:t>
-            </a:r>
-            <a:r>
-              <a:rPr lang="fr-FR" dirty="0" err="1"/>
-              <a:t>within</a:t>
-            </a:r>
-            <a:r>
-              <a:rPr lang="fr-FR" dirty="0"/>
-              <a:t> the </a:t>
-            </a:r>
-            <a:r>
-              <a:rPr lang="fr-FR" dirty="0" err="1"/>
-              <a:t>text</a:t>
-            </a:r>
-            <a:r>
-              <a:rPr lang="fr-FR" dirty="0"/>
-              <a:t> </a:t>
-            </a:r>
-            <a:r>
-              <a:rPr lang="fr-FR" dirty="0" err="1"/>
-              <a:t>rather</a:t>
-            </a:r>
-            <a:r>
-              <a:rPr lang="fr-FR" dirty="0"/>
-              <a:t> </a:t>
-            </a:r>
-            <a:r>
-              <a:rPr lang="fr-FR" dirty="0" err="1"/>
-              <a:t>than</a:t>
-            </a:r>
-            <a:r>
-              <a:rPr lang="fr-FR" dirty="0"/>
-              <a:t> at the end</a:t>
-            </a:r>
-          </a:p>
-          <a:p>
-            <a:pPr marL="285750" indent="-285750">
-              <a:buFont typeface="Arial" panose="020B0604020202020204" pitchFamily="34" charset="0"/>
-              <a:buChar char="•"/>
-            </a:pPr>
-            <a:r>
-              <a:rPr lang="en-US" sz="1400" dirty="0"/>
-              <a:t>PLEASE MENTION IN THE COVER LETTER ON SUBMISSION THAT YOU 1) AGREE TO PAY THE APF, OR 2) IF YOU THINK THAT THE APF SHOULD BE WAIVED DUE TO MEMBERSHIP OR FOR ANY OTHER REASONS</a:t>
-            </a:r>
-          </a:p>
-          <a:p>
-            <a:pPr marL="285750" indent="-285750">
-              <a:buFont typeface="Arial" panose="020B0604020202020204" pitchFamily="34" charset="0"/>
-              <a:buChar char="•"/>
-            </a:pPr>
-            <a:r>
-              <a:rPr lang="fr-FR" dirty="0"/>
-              <a:t>Notation for </a:t>
-            </a:r>
-            <a:r>
-              <a:rPr lang="fr-FR" dirty="0" err="1"/>
-              <a:t>pvalue</a:t>
-            </a:r>
-            <a:r>
-              <a:rPr lang="fr-FR" dirty="0"/>
-              <a:t>: P </a:t>
-            </a:r>
-            <a:r>
-              <a:rPr lang="fr-FR" dirty="0" err="1"/>
-              <a:t>is</a:t>
-            </a:r>
-            <a:r>
-              <a:rPr lang="fr-FR" dirty="0"/>
-              <a:t> </a:t>
-            </a:r>
-            <a:r>
-              <a:rPr lang="fr-FR" dirty="0" err="1"/>
-              <a:t>always</a:t>
-            </a:r>
-            <a:r>
-              <a:rPr lang="fr-FR" dirty="0"/>
-              <a:t> </a:t>
-            </a:r>
-            <a:r>
-              <a:rPr lang="fr-FR" dirty="0" err="1"/>
-              <a:t>italicized</a:t>
-            </a:r>
-            <a:r>
-              <a:rPr lang="fr-FR" dirty="0"/>
-              <a:t> and </a:t>
-            </a:r>
-            <a:r>
-              <a:rPr lang="fr-FR" dirty="0" err="1"/>
-              <a:t>capitalized</a:t>
-            </a:r>
-            <a:r>
-              <a:rPr lang="fr-FR" dirty="0"/>
-              <a:t> &amp; ex: ‘p = .0002’ </a:t>
-            </a:r>
-            <a:r>
-              <a:rPr lang="fr-FR" dirty="0">
-                <a:hlinkClick r:id="rId2"/>
-              </a:rPr>
-              <a:t>https://support.jmir.org/hc/en-us/articles/360000002012</a:t>
-            </a:r>
-            <a:endParaRPr lang="fr-FR" dirty="0"/>
-          </a:p>
-        </p:txBody>
-      </p:sp>
-      <p:sp>
-        <p:nvSpPr>
-          <p:cNvPr id="5" name="Espace réservé du numéro de diapositive 4">
-            <a:extLst>
-              <a:ext uri="{FF2B5EF4-FFF2-40B4-BE49-F238E27FC236}">
-                <a16:creationId xmlns:a16="http://schemas.microsoft.com/office/drawing/2014/main" id="{F50C611C-A3BB-410F-9986-C1A09768C910}"/>
+        </p:txBody>
+      </p:sp>
+      <p:sp>
+        <p:nvSpPr>
+          <p:cNvPr id="4" name="Espace réservé du numéro de diapositive 3">
+            <a:extLst>
+              <a:ext uri="{FF2B5EF4-FFF2-40B4-BE49-F238E27FC236}">
+                <a16:creationId xmlns:a16="http://schemas.microsoft.com/office/drawing/2014/main" id="{E3DAFB18-1032-4954-BB59-8FDB879308AF}"/>
               </a:ext>
             </a:extLst>
           </p:cNvPr>
@@ -4031,7 +4194,7 @@
     </p:spTree>
     <p:extLst>
       <p:ext uri="{BB962C8B-B14F-4D97-AF65-F5344CB8AC3E}">
-        <p14:creationId xmlns:p14="http://schemas.microsoft.com/office/powerpoint/2010/main" val="3699748974"/>
+        <p14:creationId xmlns:p14="http://schemas.microsoft.com/office/powerpoint/2010/main" val="2292718539"/>
       </p:ext>
     </p:extLst>
   </p:cSld>
@@ -4063,7 +4226,7 @@
           <p:cNvPr id="2" name="Titre 1">
             <a:extLst>
               <a:ext uri="{FF2B5EF4-FFF2-40B4-BE49-F238E27FC236}">
-                <a16:creationId xmlns:a16="http://schemas.microsoft.com/office/drawing/2014/main" id="{DE6C44DF-EA16-4465-B821-8EC07A65B511}"/>
+                <a16:creationId xmlns:a16="http://schemas.microsoft.com/office/drawing/2014/main" id="{C0243B02-D829-46C7-867A-E22D18FE82C5}"/>
               </a:ext>
             </a:extLst>
           </p:cNvPr>
@@ -4081,7 +4244,7 @@
           <a:p>
             <a:r>
               <a:rPr lang="fr-FR" dirty="0"/>
-              <a:t>Journal of Hypertension</a:t>
+              <a:t>CHEST</a:t>
             </a:r>
           </a:p>
         </p:txBody>
@@ -4091,7 +4254,7 @@
           <p:cNvPr id="3" name="Espace réservé du contenu 2">
             <a:extLst>
               <a:ext uri="{FF2B5EF4-FFF2-40B4-BE49-F238E27FC236}">
-                <a16:creationId xmlns:a16="http://schemas.microsoft.com/office/drawing/2014/main" id="{FD146BAC-E37B-4ADD-A619-B156C89BC865}"/>
+                <a16:creationId xmlns:a16="http://schemas.microsoft.com/office/drawing/2014/main" id="{4B9EC3D9-2822-43D7-A88D-63B136550D1F}"/>
               </a:ext>
             </a:extLst>
           </p:cNvPr>
@@ -4102,234 +4265,117 @@
             <p:ph idx="1"/>
           </p:nvPr>
         </p:nvSpPr>
-        <p:spPr/>
+        <p:spPr>
+          <a:xfrm>
+            <a:off x="838200" y="1825625"/>
+            <a:ext cx="10515600" cy="4768122"/>
+          </a:xfrm>
+        </p:spPr>
         <p:txBody>
           <a:bodyPr>
-            <a:normAutofit fontScale="92500"/>
+            <a:normAutofit fontScale="77500" lnSpcReduction="20000"/>
           </a:bodyPr>
           <a:lstStyle/>
           <a:p>
             <a:r>
-              <a:rPr lang="fr-FR" dirty="0"/>
-              <a:t>3500 </a:t>
-            </a:r>
-            <a:r>
-              <a:rPr lang="fr-FR" dirty="0" err="1"/>
-              <a:t>words</a:t>
-            </a:r>
-            <a:r>
-              <a:rPr lang="fr-FR" dirty="0"/>
-              <a:t> </a:t>
-            </a:r>
-            <a:r>
-              <a:rPr lang="fr-FR" dirty="0" err="1"/>
-              <a:t>excluding</a:t>
-            </a:r>
-            <a:r>
-              <a:rPr lang="fr-FR" dirty="0"/>
-              <a:t> abstract and </a:t>
-            </a:r>
-            <a:r>
-              <a:rPr lang="fr-FR" dirty="0" err="1"/>
-              <a:t>references</a:t>
-            </a:r>
-            <a:endParaRPr lang="fr-FR" dirty="0"/>
-          </a:p>
-          <a:p>
-            <a:r>
-              <a:rPr lang="fr-FR" dirty="0"/>
-              <a:t>5 illustrations (figures or tables)</a:t>
-            </a:r>
-          </a:p>
-          <a:p>
-            <a:r>
-              <a:rPr lang="fr-FR" dirty="0"/>
-              <a:t>Abstract = 250 </a:t>
-            </a:r>
-            <a:r>
-              <a:rPr lang="fr-FR" dirty="0" err="1"/>
-              <a:t>words</a:t>
-            </a:r>
-            <a:endParaRPr lang="fr-FR" dirty="0"/>
-          </a:p>
-          <a:p>
-            <a:r>
-              <a:rPr lang="fr-FR" dirty="0" err="1"/>
-              <a:t>Title</a:t>
-            </a:r>
-            <a:r>
-              <a:rPr lang="fr-FR" dirty="0"/>
-              <a:t> = 20 </a:t>
-            </a:r>
-            <a:r>
-              <a:rPr lang="fr-FR" dirty="0" err="1"/>
-              <a:t>words</a:t>
-            </a:r>
-            <a:endParaRPr lang="fr-FR" dirty="0"/>
-          </a:p>
-          <a:p>
-            <a:r>
-              <a:rPr lang="fr-FR" dirty="0" err="1"/>
-              <a:t>Authors</a:t>
-            </a:r>
-            <a:r>
-              <a:rPr lang="fr-FR" dirty="0"/>
-              <a:t>: last </a:t>
-            </a:r>
-            <a:r>
-              <a:rPr lang="fr-FR" dirty="0" err="1"/>
-              <a:t>name</a:t>
-            </a:r>
-            <a:r>
-              <a:rPr lang="fr-FR" dirty="0"/>
-              <a:t> in CAPITAL </a:t>
-            </a:r>
-            <a:r>
-              <a:rPr lang="fr-FR" dirty="0" err="1"/>
-              <a:t>letters</a:t>
-            </a:r>
-            <a:endParaRPr lang="fr-FR" dirty="0"/>
-          </a:p>
-          <a:p>
-            <a:r>
-              <a:rPr lang="fr-FR" dirty="0" err="1"/>
-              <a:t>Title</a:t>
-            </a:r>
-            <a:r>
-              <a:rPr lang="fr-FR" dirty="0"/>
-              <a:t> page: </a:t>
-            </a:r>
-            <a:r>
-              <a:rPr lang="fr-FR" dirty="0" err="1"/>
-              <a:t>titel</a:t>
-            </a:r>
-            <a:r>
-              <a:rPr lang="fr-FR" dirty="0"/>
-              <a:t>, </a:t>
-            </a:r>
-            <a:r>
-              <a:rPr lang="fr-FR" dirty="0" err="1"/>
-              <a:t>authors</a:t>
-            </a:r>
-            <a:r>
-              <a:rPr lang="fr-FR" dirty="0"/>
-              <a:t>, affiliations, </a:t>
-            </a:r>
-            <a:r>
-              <a:rPr lang="fr-FR" dirty="0" err="1"/>
-              <a:t>funding</a:t>
-            </a:r>
-            <a:r>
-              <a:rPr lang="fr-FR" dirty="0"/>
-              <a:t>, </a:t>
-            </a:r>
-            <a:r>
-              <a:rPr lang="fr-FR" dirty="0" err="1"/>
-              <a:t>conflict</a:t>
-            </a:r>
-            <a:r>
-              <a:rPr lang="fr-FR" dirty="0"/>
-              <a:t> of </a:t>
-            </a:r>
-            <a:r>
-              <a:rPr lang="fr-FR" dirty="0" err="1"/>
-              <a:t>interest</a:t>
-            </a:r>
-            <a:r>
-              <a:rPr lang="fr-FR" dirty="0"/>
-              <a:t>, </a:t>
-            </a:r>
-            <a:r>
-              <a:rPr lang="fr-FR" dirty="0" err="1"/>
-              <a:t>corresponding</a:t>
-            </a:r>
-            <a:r>
-              <a:rPr lang="fr-FR" dirty="0"/>
-              <a:t> </a:t>
-            </a:r>
-            <a:r>
-              <a:rPr lang="fr-FR" dirty="0" err="1"/>
-              <a:t>author</a:t>
-            </a:r>
-            <a:r>
-              <a:rPr lang="fr-FR" dirty="0"/>
-              <a:t>, </a:t>
-            </a:r>
-            <a:r>
-              <a:rPr lang="fr-FR" dirty="0" err="1"/>
-              <a:t>word</a:t>
-            </a:r>
-            <a:r>
-              <a:rPr lang="fr-FR" dirty="0"/>
-              <a:t> count, </a:t>
-            </a:r>
-            <a:r>
-              <a:rPr lang="fr-FR" dirty="0" err="1"/>
-              <a:t>number</a:t>
-            </a:r>
-            <a:r>
-              <a:rPr lang="fr-FR" dirty="0"/>
-              <a:t> of tables and </a:t>
-            </a:r>
-            <a:r>
-              <a:rPr lang="fr-FR" dirty="0" err="1"/>
-              <a:t>number</a:t>
-            </a:r>
-            <a:r>
-              <a:rPr lang="fr-FR" dirty="0"/>
-              <a:t> of figures</a:t>
-            </a:r>
-          </a:p>
-          <a:p>
-            <a:r>
-              <a:rPr lang="fr-FR" dirty="0"/>
-              <a:t>Abstract: 2</a:t>
-            </a:r>
-            <a:r>
-              <a:rPr lang="fr-FR" baseline="30000" dirty="0"/>
-              <a:t>nd</a:t>
-            </a:r>
-            <a:r>
-              <a:rPr lang="fr-FR" dirty="0"/>
-              <a:t> page, </a:t>
-            </a:r>
-            <a:r>
-              <a:rPr lang="fr-FR" dirty="0" err="1"/>
-              <a:t>Objectvies</a:t>
-            </a:r>
-            <a:r>
-              <a:rPr lang="fr-FR" dirty="0"/>
-              <a:t>, </a:t>
-            </a:r>
-            <a:r>
-              <a:rPr lang="fr-FR" dirty="0" err="1"/>
-              <a:t>methods</a:t>
-            </a:r>
-            <a:r>
-              <a:rPr lang="fr-FR" dirty="0"/>
-              <a:t>, main </a:t>
-            </a:r>
-            <a:r>
-              <a:rPr lang="fr-FR" dirty="0" err="1"/>
-              <a:t>results</a:t>
-            </a:r>
-            <a:r>
-              <a:rPr lang="fr-FR" dirty="0"/>
-              <a:t> and conclusions</a:t>
-            </a:r>
-          </a:p>
-          <a:p>
-            <a:r>
-              <a:rPr lang="fr-FR" dirty="0"/>
-              <a:t>Key </a:t>
-            </a:r>
-            <a:r>
-              <a:rPr lang="fr-FR" dirty="0" err="1"/>
-              <a:t>words</a:t>
-            </a:r>
-            <a:r>
-              <a:rPr lang="fr-FR" dirty="0"/>
-              <a:t>: 3-10</a:t>
+              <a:rPr lang="en-US" b="1" dirty="0"/>
+              <a:t>Cover letter</a:t>
+            </a:r>
+          </a:p>
+          <a:p>
+            <a:r>
+              <a:rPr lang="en-US" b="1" dirty="0"/>
+              <a:t>Title page: word counts / title (50 characters or less) / author list / institutional review board / corresponding author information / summary conflict of interest statements for each author / funding information / notation of prior abstract, presentation / acknowledgement</a:t>
+            </a:r>
+          </a:p>
+          <a:p>
+            <a:r>
+              <a:rPr lang="en-US" b="1" dirty="0"/>
+              <a:t>Manuscript: Key words list</a:t>
+            </a:r>
+            <a:r>
+              <a:rPr lang="en-US" dirty="0"/>
+              <a:t>/ </a:t>
+            </a:r>
+            <a:r>
+              <a:rPr lang="en-US" b="1" dirty="0"/>
+              <a:t>Abbreviations list</a:t>
+            </a:r>
+            <a:r>
+              <a:rPr lang="en-US" dirty="0"/>
+              <a:t>/ </a:t>
+            </a:r>
+            <a:r>
+              <a:rPr lang="en-US" b="1" dirty="0"/>
+              <a:t>Abstract (Background, research question, study design and methods, results, interpretation, CTR; 300 words max)/ Text (each subheading only 5 words; 3200 words max)</a:t>
+            </a:r>
+            <a:r>
+              <a:rPr lang="en-US" dirty="0"/>
+              <a:t>/ </a:t>
+            </a:r>
+            <a:r>
+              <a:rPr lang="en-US" b="1" dirty="0"/>
+              <a:t>Acknowledgments (include in Title page)</a:t>
+            </a:r>
+            <a:r>
+              <a:rPr lang="en-US" dirty="0"/>
+              <a:t>/ </a:t>
+            </a:r>
+            <a:r>
+              <a:rPr lang="en-US" b="1" dirty="0"/>
+              <a:t>References (50 max)</a:t>
+            </a:r>
+            <a:r>
+              <a:rPr lang="en-US" dirty="0"/>
+              <a:t>/ </a:t>
+            </a:r>
+            <a:r>
+              <a:rPr lang="en-US" b="1" dirty="0"/>
+              <a:t>Tables</a:t>
+            </a:r>
+            <a:r>
+              <a:rPr lang="en-US" dirty="0"/>
+              <a:t>/ </a:t>
+            </a:r>
+            <a:r>
+              <a:rPr lang="en-US" b="1" dirty="0"/>
+              <a:t>Figure legends</a:t>
+            </a:r>
+          </a:p>
+          <a:p>
+            <a:r>
+              <a:rPr lang="en-US" b="1" dirty="0"/>
+              <a:t>Figure files</a:t>
+            </a:r>
+          </a:p>
+          <a:p>
+            <a:r>
+              <a:rPr lang="en-US" b="1" dirty="0"/>
+              <a:t>SM: notation of tables and figures -&gt; e-Table 1, e-Table 2, …, e-Figure 1, e-Figure 2, …</a:t>
+            </a:r>
+          </a:p>
+          <a:p>
+            <a:r>
+              <a:rPr lang="en-US" b="1" dirty="0"/>
+              <a:t>Permissions</a:t>
+            </a:r>
+          </a:p>
+          <a:p>
+            <a:r>
+              <a:rPr lang="en-US" b="1" dirty="0"/>
+              <a:t>Patient consent</a:t>
+            </a:r>
+          </a:p>
+          <a:p>
+            <a:r>
+              <a:rPr lang="en-US" b="1" dirty="0"/>
+              <a:t>Conflict of interest form</a:t>
+            </a:r>
+          </a:p>
+          <a:p>
+            <a:r>
+              <a:rPr lang="en-US" b="1" dirty="0"/>
+              <a:t>Anonymization of the article (no name, no institute, no place)</a:t>
             </a:r>
           </a:p>
         </p:txBody>
@@ -4339,7 +4385,7 @@
           <p:cNvPr id="4" name="Espace réservé du numéro de diapositive 3">
             <a:extLst>
               <a:ext uri="{FF2B5EF4-FFF2-40B4-BE49-F238E27FC236}">
-                <a16:creationId xmlns:a16="http://schemas.microsoft.com/office/drawing/2014/main" id="{C15F892A-65AB-4572-9BF7-A7B502D91DF7}"/>
+                <a16:creationId xmlns:a16="http://schemas.microsoft.com/office/drawing/2014/main" id="{D9956308-4D5A-409B-9081-A10AFDCB4429}"/>
               </a:ext>
             </a:extLst>
           </p:cNvPr>
@@ -4359,14 +4405,14 @@
               <a:rPr lang="en-US" smtClean="0"/>
               <a:t>2</a:t>
             </a:fld>
-            <a:endParaRPr lang="en-US"/>
+            <a:endParaRPr lang="en-US" dirty="0"/>
           </a:p>
         </p:txBody>
       </p:sp>
     </p:spTree>
     <p:extLst>
       <p:ext uri="{BB962C8B-B14F-4D97-AF65-F5344CB8AC3E}">
-        <p14:creationId xmlns:p14="http://schemas.microsoft.com/office/powerpoint/2010/main" val="4234946802"/>
+        <p14:creationId xmlns:p14="http://schemas.microsoft.com/office/powerpoint/2010/main" val="1716418729"/>
       </p:ext>
     </p:extLst>
   </p:cSld>
@@ -4398,7 +4444,7 @@
           <p:cNvPr id="2" name="Titre 1">
             <a:extLst>
               <a:ext uri="{FF2B5EF4-FFF2-40B4-BE49-F238E27FC236}">
-                <a16:creationId xmlns:a16="http://schemas.microsoft.com/office/drawing/2014/main" id="{C0243B02-D829-46C7-867A-E22D18FE82C5}"/>
+                <a16:creationId xmlns:a16="http://schemas.microsoft.com/office/drawing/2014/main" id="{25C64DB7-F060-4A44-BEFA-880352A3BBA3}"/>
               </a:ext>
             </a:extLst>
           </p:cNvPr>
@@ -4416,8 +4462,9 @@
           <a:p>
             <a:r>
               <a:rPr lang="fr-FR" dirty="0"/>
-              <a:t>CHEST</a:t>
-            </a:r>
+              <a:t>JMIR</a:t>
+            </a:r>
+            <a:endParaRPr lang="en-US" dirty="0"/>
           </a:p>
         </p:txBody>
       </p:sp>
@@ -4426,7 +4473,7 @@
           <p:cNvPr id="3" name="Espace réservé du contenu 2">
             <a:extLst>
               <a:ext uri="{FF2B5EF4-FFF2-40B4-BE49-F238E27FC236}">
-                <a16:creationId xmlns:a16="http://schemas.microsoft.com/office/drawing/2014/main" id="{4B9EC3D9-2822-43D7-A88D-63B136550D1F}"/>
+                <a16:creationId xmlns:a16="http://schemas.microsoft.com/office/drawing/2014/main" id="{3F83C914-0343-44CC-9A83-36358D43C53D}"/>
               </a:ext>
             </a:extLst>
           </p:cNvPr>
@@ -4440,124 +4487,248 @@
         <p:spPr>
           <a:xfrm>
             <a:off x="838200" y="1825625"/>
-            <a:ext cx="10515600" cy="4768122"/>
+            <a:ext cx="5445154" cy="4351338"/>
           </a:xfrm>
         </p:spPr>
         <p:txBody>
           <a:bodyPr>
-            <a:normAutofit fontScale="77500" lnSpcReduction="20000"/>
+            <a:normAutofit fontScale="85000" lnSpcReduction="20000"/>
           </a:bodyPr>
           <a:lstStyle/>
           <a:p>
             <a:r>
-              <a:rPr lang="en-US" b="1" dirty="0"/>
-              <a:t>Cover letter</a:t>
-            </a:r>
-          </a:p>
-          <a:p>
-            <a:r>
-              <a:rPr lang="en-US" b="1" dirty="0"/>
-              <a:t>Title page: word counts / title (50 characters or less) / author list / institutional review board / corresponding author information / summary conflict of interest statements for each author / funding information / notation of prior abstract, presentation / acknowledgement</a:t>
-            </a:r>
-          </a:p>
-          <a:p>
-            <a:r>
-              <a:rPr lang="en-US" b="1" dirty="0"/>
-              <a:t>Manuscript: Key words list</a:t>
-            </a:r>
-            <a:r>
-              <a:rPr lang="en-US" dirty="0"/>
-              <a:t>/ </a:t>
-            </a:r>
-            <a:r>
-              <a:rPr lang="en-US" b="1" dirty="0"/>
-              <a:t>Abbreviations list</a:t>
-            </a:r>
-            <a:r>
-              <a:rPr lang="en-US" dirty="0"/>
-              <a:t>/ </a:t>
-            </a:r>
-            <a:r>
-              <a:rPr lang="en-US" b="1" dirty="0"/>
-              <a:t>Abstract (Background, research question, study design and methods, results, interpretation, CTR; 300 words max)/ Text (each subheading only 5 words; 3200 words max)</a:t>
-            </a:r>
-            <a:r>
-              <a:rPr lang="en-US" dirty="0"/>
-              <a:t>/ </a:t>
-            </a:r>
-            <a:r>
-              <a:rPr lang="en-US" b="1" dirty="0"/>
-              <a:t>Acknowledgments (include in Title page)</a:t>
-            </a:r>
-            <a:r>
-              <a:rPr lang="en-US" dirty="0"/>
-              <a:t>/ </a:t>
-            </a:r>
-            <a:r>
-              <a:rPr lang="en-US" b="1" dirty="0"/>
-              <a:t>References (50 max)</a:t>
-            </a:r>
-            <a:r>
-              <a:rPr lang="en-US" dirty="0"/>
-              <a:t>/ </a:t>
-            </a:r>
-            <a:r>
-              <a:rPr lang="en-US" b="1" dirty="0"/>
-              <a:t>Tables</a:t>
-            </a:r>
-            <a:r>
-              <a:rPr lang="en-US" dirty="0"/>
-              <a:t>/ </a:t>
-            </a:r>
-            <a:r>
-              <a:rPr lang="en-US" b="1" dirty="0"/>
-              <a:t>Figure legends</a:t>
-            </a:r>
-          </a:p>
-          <a:p>
-            <a:r>
-              <a:rPr lang="en-US" b="1" dirty="0"/>
-              <a:t>Figure files</a:t>
-            </a:r>
-          </a:p>
-          <a:p>
-            <a:r>
-              <a:rPr lang="en-US" b="1" dirty="0"/>
-              <a:t>SM: notation of tables and figures -&gt; e-Table 1, e-Table 2, …, e-Figure 1, e-Figure 2, …</a:t>
-            </a:r>
-          </a:p>
-          <a:p>
-            <a:r>
-              <a:rPr lang="en-US" b="1" dirty="0"/>
-              <a:t>Permissions</a:t>
-            </a:r>
-          </a:p>
-          <a:p>
-            <a:r>
-              <a:rPr lang="en-US" b="1" dirty="0"/>
-              <a:t>Patient consent</a:t>
-            </a:r>
-          </a:p>
-          <a:p>
-            <a:r>
-              <a:rPr lang="en-US" b="1" dirty="0"/>
-              <a:t>Conflict of interest form</a:t>
-            </a:r>
-          </a:p>
-          <a:p>
-            <a:r>
-              <a:rPr lang="en-US" b="1" dirty="0"/>
-              <a:t>Anonymization of the article (no name, no institute, no place)</a:t>
-            </a:r>
-          </a:p>
-        </p:txBody>
-      </p:sp>
-      <p:sp>
-        <p:nvSpPr>
-          <p:cNvPr id="4" name="Espace réservé du numéro de diapositive 3">
-            <a:extLst>
-              <a:ext uri="{FF2B5EF4-FFF2-40B4-BE49-F238E27FC236}">
-                <a16:creationId xmlns:a16="http://schemas.microsoft.com/office/drawing/2014/main" id="{D9956308-4D5A-409B-9081-A10AFDCB4429}"/>
+              <a:rPr lang="fr-FR" dirty="0" err="1"/>
+              <a:t>Title</a:t>
+            </a:r>
+            <a:endParaRPr lang="fr-FR" dirty="0"/>
+          </a:p>
+          <a:p>
+            <a:r>
+              <a:rPr lang="fr-FR" dirty="0"/>
+              <a:t>Abstract (450 </a:t>
+            </a:r>
+            <a:r>
+              <a:rPr lang="fr-FR" dirty="0" err="1"/>
+              <a:t>words</a:t>
+            </a:r>
+            <a:r>
+              <a:rPr lang="fr-FR" dirty="0"/>
+              <a:t>)</a:t>
+            </a:r>
+          </a:p>
+          <a:p>
+            <a:r>
+              <a:rPr lang="fr-FR" dirty="0"/>
+              <a:t>Keywords</a:t>
+            </a:r>
+          </a:p>
+          <a:p>
+            <a:r>
+              <a:rPr lang="fr-FR" dirty="0"/>
+              <a:t>Introduction</a:t>
+            </a:r>
+          </a:p>
+          <a:p>
+            <a:r>
+              <a:rPr lang="fr-FR" dirty="0"/>
+              <a:t>Methods</a:t>
+            </a:r>
+          </a:p>
+          <a:p>
+            <a:r>
+              <a:rPr lang="fr-FR" dirty="0" err="1"/>
+              <a:t>Results</a:t>
+            </a:r>
+            <a:endParaRPr lang="fr-FR" dirty="0"/>
+          </a:p>
+          <a:p>
+            <a:r>
+              <a:rPr lang="fr-FR" dirty="0"/>
+              <a:t>Discussion (conclusion dans cette partie)</a:t>
+            </a:r>
+          </a:p>
+          <a:p>
+            <a:r>
+              <a:rPr lang="fr-FR" dirty="0" err="1"/>
+              <a:t>Acknowledgments</a:t>
+            </a:r>
+            <a:endParaRPr lang="fr-FR" dirty="0"/>
+          </a:p>
+          <a:p>
+            <a:r>
+              <a:rPr lang="fr-FR" dirty="0" err="1"/>
+              <a:t>Conflicts</a:t>
+            </a:r>
+            <a:r>
+              <a:rPr lang="fr-FR" dirty="0"/>
+              <a:t> of </a:t>
+            </a:r>
+            <a:r>
+              <a:rPr lang="fr-FR" dirty="0" err="1"/>
+              <a:t>interest</a:t>
+            </a:r>
+            <a:endParaRPr lang="fr-FR" dirty="0"/>
+          </a:p>
+          <a:p>
+            <a:r>
+              <a:rPr lang="fr-FR" dirty="0" err="1"/>
+              <a:t>Ref</a:t>
+            </a:r>
+            <a:endParaRPr lang="fr-FR" dirty="0"/>
+          </a:p>
+          <a:p>
+            <a:r>
+              <a:rPr lang="fr-FR" dirty="0" err="1"/>
+              <a:t>Abbreviations</a:t>
+            </a:r>
+            <a:endParaRPr lang="en-US" dirty="0"/>
+          </a:p>
+        </p:txBody>
+      </p:sp>
+      <p:sp>
+        <p:nvSpPr>
+          <p:cNvPr id="4" name="ZoneTexte 3">
+            <a:extLst>
+              <a:ext uri="{FF2B5EF4-FFF2-40B4-BE49-F238E27FC236}">
+                <a16:creationId xmlns:a16="http://schemas.microsoft.com/office/drawing/2014/main" id="{41FCB5BA-958F-492A-A649-E5DFC6B954E2}"/>
+              </a:ext>
+            </a:extLst>
+          </p:cNvPr>
+          <p:cNvSpPr txBox="1"/>
+          <p:nvPr/>
+        </p:nvSpPr>
+        <p:spPr>
+          <a:xfrm>
+            <a:off x="8019875" y="1568741"/>
+            <a:ext cx="3187817" cy="3323987"/>
+          </a:xfrm>
+          <a:prstGeom prst="rect">
+            <a:avLst/>
+          </a:prstGeom>
+          <a:noFill/>
+        </p:spPr>
+        <p:txBody>
+          <a:bodyPr wrap="square" rtlCol="0">
+            <a:spAutoFit/>
+          </a:bodyPr>
+          <a:lstStyle/>
+          <a:p>
+            <a:pPr marL="285750" indent="-285750">
+              <a:buFont typeface="Arial" panose="020B0604020202020204" pitchFamily="34" charset="0"/>
+              <a:buChar char="•"/>
+            </a:pPr>
+            <a:r>
+              <a:rPr lang="fr-FR" dirty="0"/>
+              <a:t>Tables and figures </a:t>
+            </a:r>
+            <a:r>
+              <a:rPr lang="fr-FR" dirty="0" err="1"/>
+              <a:t>within</a:t>
+            </a:r>
+            <a:r>
+              <a:rPr lang="fr-FR" dirty="0"/>
+              <a:t> the </a:t>
+            </a:r>
+            <a:r>
+              <a:rPr lang="fr-FR" dirty="0" err="1"/>
+              <a:t>text</a:t>
+            </a:r>
+            <a:r>
+              <a:rPr lang="fr-FR" dirty="0"/>
+              <a:t> </a:t>
+            </a:r>
+            <a:r>
+              <a:rPr lang="fr-FR" dirty="0" err="1"/>
+              <a:t>rather</a:t>
+            </a:r>
+            <a:r>
+              <a:rPr lang="fr-FR" dirty="0"/>
+              <a:t> </a:t>
+            </a:r>
+            <a:r>
+              <a:rPr lang="fr-FR" dirty="0" err="1"/>
+              <a:t>than</a:t>
+            </a:r>
+            <a:r>
+              <a:rPr lang="fr-FR" dirty="0"/>
+              <a:t> at the end</a:t>
+            </a:r>
+          </a:p>
+          <a:p>
+            <a:pPr marL="285750" indent="-285750">
+              <a:buFont typeface="Arial" panose="020B0604020202020204" pitchFamily="34" charset="0"/>
+              <a:buChar char="•"/>
+            </a:pPr>
+            <a:r>
+              <a:rPr lang="en-US" sz="1400" dirty="0"/>
+              <a:t>PLEASE MENTION IN THE COVER LETTER ON SUBMISSION THAT YOU 1) AGREE TO PAY THE APF, OR 2) IF YOU THINK THAT THE APF SHOULD BE WAIVED DUE TO MEMBERSHIP OR FOR ANY OTHER REASONS</a:t>
+            </a:r>
+          </a:p>
+          <a:p>
+            <a:pPr marL="285750" indent="-285750">
+              <a:buFont typeface="Arial" panose="020B0604020202020204" pitchFamily="34" charset="0"/>
+              <a:buChar char="•"/>
+            </a:pPr>
+            <a:r>
+              <a:rPr lang="fr-FR" dirty="0"/>
+              <a:t>Notation for </a:t>
+            </a:r>
+            <a:r>
+              <a:rPr lang="fr-FR" dirty="0" err="1"/>
+              <a:t>pvalue</a:t>
+            </a:r>
+            <a:r>
+              <a:rPr lang="fr-FR" dirty="0"/>
+              <a:t>: P </a:t>
+            </a:r>
+            <a:r>
+              <a:rPr lang="fr-FR" dirty="0" err="1"/>
+              <a:t>is</a:t>
+            </a:r>
+            <a:r>
+              <a:rPr lang="fr-FR" dirty="0"/>
+              <a:t> </a:t>
+            </a:r>
+            <a:r>
+              <a:rPr lang="fr-FR" dirty="0" err="1"/>
+              <a:t>always</a:t>
+            </a:r>
+            <a:r>
+              <a:rPr lang="fr-FR" dirty="0"/>
+              <a:t> </a:t>
+            </a:r>
+            <a:r>
+              <a:rPr lang="fr-FR" dirty="0" err="1"/>
+              <a:t>italicized</a:t>
+            </a:r>
+            <a:r>
+              <a:rPr lang="fr-FR" dirty="0"/>
+              <a:t> and </a:t>
+            </a:r>
+            <a:r>
+              <a:rPr lang="fr-FR" dirty="0" err="1"/>
+              <a:t>capitalized</a:t>
+            </a:r>
+            <a:r>
+              <a:rPr lang="fr-FR" dirty="0"/>
+              <a:t> &amp; ex: ‘p = .0002’ </a:t>
+            </a:r>
+            <a:r>
+              <a:rPr lang="fr-FR" dirty="0">
+                <a:hlinkClick r:id="rId2"/>
+              </a:rPr>
+              <a:t>https://support.jmir.org/hc/en-us/articles/360000002012</a:t>
+            </a:r>
+            <a:endParaRPr lang="fr-FR" dirty="0"/>
+          </a:p>
+        </p:txBody>
+      </p:sp>
+      <p:sp>
+        <p:nvSpPr>
+          <p:cNvPr id="5" name="Espace réservé du numéro de diapositive 4">
+            <a:extLst>
+              <a:ext uri="{FF2B5EF4-FFF2-40B4-BE49-F238E27FC236}">
+                <a16:creationId xmlns:a16="http://schemas.microsoft.com/office/drawing/2014/main" id="{F50C611C-A3BB-410F-9986-C1A09768C910}"/>
               </a:ext>
             </a:extLst>
           </p:cNvPr>
@@ -4577,14 +4748,14 @@
               <a:rPr lang="en-US" smtClean="0"/>
               <a:t>3</a:t>
             </a:fld>
-            <a:endParaRPr lang="en-US" dirty="0"/>
+            <a:endParaRPr lang="en-US"/>
           </a:p>
         </p:txBody>
       </p:sp>
     </p:spTree>
     <p:extLst>
       <p:ext uri="{BB962C8B-B14F-4D97-AF65-F5344CB8AC3E}">
-        <p14:creationId xmlns:p14="http://schemas.microsoft.com/office/powerpoint/2010/main" val="1716418729"/>
+        <p14:creationId xmlns:p14="http://schemas.microsoft.com/office/powerpoint/2010/main" val="3699748974"/>
       </p:ext>
     </p:extLst>
   </p:cSld>

</xml_diff>

<commit_message>
Editing for a specific journal
</commit_message>
<xml_diff>
--- a/Documents/Journaux_indications.pptx
+++ b/Documents/Journaux_indications.pptx
@@ -211,7 +211,7 @@
           <a:p>
             <a:fld id="{CA0487E4-8977-4435-9767-431453041D86}" type="datetimeFigureOut">
               <a:rPr lang="en-US" smtClean="0"/>
-              <a:t>2/5/2025</a:t>
+              <a:t>2/12/2025</a:t>
             </a:fld>
             <a:endParaRPr lang="en-US"/>
           </a:p>
@@ -628,7 +628,7 @@
           <a:p>
             <a:fld id="{E4C0FCB3-52D6-429D-8EEB-ECC2DDBFE593}" type="datetime1">
               <a:rPr lang="en-US" smtClean="0"/>
-              <a:t>2/5/2025</a:t>
+              <a:t>2/12/2025</a:t>
             </a:fld>
             <a:endParaRPr lang="en-US"/>
           </a:p>
@@ -828,7 +828,7 @@
           <a:p>
             <a:fld id="{C14FDDEC-43EB-4402-A894-49EBA5F669BC}" type="datetime1">
               <a:rPr lang="en-US" smtClean="0"/>
-              <a:t>2/5/2025</a:t>
+              <a:t>2/12/2025</a:t>
             </a:fld>
             <a:endParaRPr lang="en-US"/>
           </a:p>
@@ -1038,7 +1038,7 @@
           <a:p>
             <a:fld id="{0F9FFFF5-9BA5-4362-8C99-BDD0BD63D6BF}" type="datetime1">
               <a:rPr lang="en-US" smtClean="0"/>
-              <a:t>2/5/2025</a:t>
+              <a:t>2/12/2025</a:t>
             </a:fld>
             <a:endParaRPr lang="en-US"/>
           </a:p>
@@ -1238,7 +1238,7 @@
           <a:p>
             <a:fld id="{D0FCB337-F03C-419A-B728-77697081B5CB}" type="datetime1">
               <a:rPr lang="en-US" smtClean="0"/>
-              <a:t>2/5/2025</a:t>
+              <a:t>2/12/2025</a:t>
             </a:fld>
             <a:endParaRPr lang="en-US"/>
           </a:p>
@@ -1514,7 +1514,7 @@
           <a:p>
             <a:fld id="{658ABB29-787F-4BC9-9838-FA048E57D2E1}" type="datetime1">
               <a:rPr lang="en-US" smtClean="0"/>
-              <a:t>2/5/2025</a:t>
+              <a:t>2/12/2025</a:t>
             </a:fld>
             <a:endParaRPr lang="en-US"/>
           </a:p>
@@ -1782,7 +1782,7 @@
           <a:p>
             <a:fld id="{0CD9637E-68CD-4908-A844-A3068EF4DDD4}" type="datetime1">
               <a:rPr lang="en-US" smtClean="0"/>
-              <a:t>2/5/2025</a:t>
+              <a:t>2/12/2025</a:t>
             </a:fld>
             <a:endParaRPr lang="en-US"/>
           </a:p>
@@ -2197,7 +2197,7 @@
           <a:p>
             <a:fld id="{5B5D8E17-E1EB-4873-998B-3F7EE6B1DCCD}" type="datetime1">
               <a:rPr lang="en-US" smtClean="0"/>
-              <a:t>2/5/2025</a:t>
+              <a:t>2/12/2025</a:t>
             </a:fld>
             <a:endParaRPr lang="en-US"/>
           </a:p>
@@ -2339,7 +2339,7 @@
           <a:p>
             <a:fld id="{377C253B-871C-4D4E-805B-60D4D3F33600}" type="datetime1">
               <a:rPr lang="en-US" smtClean="0"/>
-              <a:t>2/5/2025</a:t>
+              <a:t>2/12/2025</a:t>
             </a:fld>
             <a:endParaRPr lang="en-US"/>
           </a:p>
@@ -2452,7 +2452,7 @@
           <a:p>
             <a:fld id="{9CC6FFEB-1F2C-4CEC-BEC0-C37CAA061E22}" type="datetime1">
               <a:rPr lang="en-US" smtClean="0"/>
-              <a:t>2/5/2025</a:t>
+              <a:t>2/12/2025</a:t>
             </a:fld>
             <a:endParaRPr lang="en-US"/>
           </a:p>
@@ -2765,7 +2765,7 @@
           <a:p>
             <a:fld id="{B553111D-1985-405C-B327-608F43691A18}" type="datetime1">
               <a:rPr lang="en-US" smtClean="0"/>
-              <a:t>2/5/2025</a:t>
+              <a:t>2/12/2025</a:t>
             </a:fld>
             <a:endParaRPr lang="en-US"/>
           </a:p>
@@ -3054,7 +3054,7 @@
           <a:p>
             <a:fld id="{2A3DC28B-AE7D-402A-809A-035203BBCA02}" type="datetime1">
               <a:rPr lang="en-US" smtClean="0"/>
-              <a:t>2/5/2025</a:t>
+              <a:t>2/12/2025</a:t>
             </a:fld>
             <a:endParaRPr lang="en-US"/>
           </a:p>
@@ -3297,7 +3297,7 @@
           <a:p>
             <a:fld id="{2203A9BC-E20C-45DF-A577-89EA961A7E97}" type="datetime1">
               <a:rPr lang="en-US" smtClean="0"/>
-              <a:t>2/5/2025</a:t>
+              <a:t>2/12/2025</a:t>
             </a:fld>
             <a:endParaRPr lang="en-US"/>
           </a:p>
@@ -3737,8 +3737,12 @@
           <a:lstStyle/>
           <a:p>
             <a:r>
-              <a:rPr lang="fr-FR" dirty="0"/>
-              <a:t>Journal for publication / Impact Factor</a:t>
+              <a:rPr lang="fr-FR" dirty="0" err="1"/>
+              <a:t>Journals</a:t>
+            </a:r>
+            <a:r>
+              <a:rPr lang="fr-FR" dirty="0"/>
+              <a:t> for publication / Impact Factor</a:t>
             </a:r>
           </a:p>
         </p:txBody>

</xml_diff>